<commit_message>
everything ready with ppt
</commit_message>
<xml_diff>
--- a/PRESENTATION/Soquimich (SQM) – Empirical Finance &.pptx
+++ b/PRESENTATION/Soquimich (SQM) – Empirical Finance &.pptx
@@ -11,9 +11,10 @@
     <p:sldId id="259" r:id="rId5"/>
     <p:sldId id="265" r:id="rId6"/>
     <p:sldId id="264" r:id="rId7"/>
-    <p:sldId id="262" r:id="rId8"/>
-    <p:sldId id="263" r:id="rId9"/>
-    <p:sldId id="261" r:id="rId10"/>
+    <p:sldId id="266" r:id="rId8"/>
+    <p:sldId id="262" r:id="rId9"/>
+    <p:sldId id="263" r:id="rId10"/>
+    <p:sldId id="261" r:id="rId11"/>
   </p:sldIdLst>
   <p:sldSz cx="12192000" cy="6858000"/>
   <p:notesSz cx="6858000" cy="9144000"/>
@@ -112,6 +113,11 @@
       </a:defRPr>
     </a:lvl9pPr>
   </p:defaultTextStyle>
+  <p:extLst>
+    <p:ext uri="{EFAFB233-063F-42B5-8137-9DF3F51BA10A}">
+      <p15:sldGuideLst xmlns:p15="http://schemas.microsoft.com/office/powerpoint/2012/main"/>
+    </p:ext>
+  </p:extLst>
 </p:presentation>
 </file>
 
@@ -268,7 +274,7 @@
           <a:p>
             <a:fld id="{D1D1EADE-8E88-4C7C-8AC5-FB148DE4940E}" type="datetime1">
               <a:rPr lang="en-US" smtClean="0"/>
-              <a:t>2/13/2026</a:t>
+              <a:t>2/21/2026</a:t>
             </a:fld>
             <a:endParaRPr lang="en-US"/>
           </a:p>
@@ -468,7 +474,7 @@
           <a:p>
             <a:fld id="{EC3C8B9C-477D-492A-96AD-1FC2CC997A73}" type="datetime1">
               <a:rPr lang="en-US" smtClean="0"/>
-              <a:t>2/13/2026</a:t>
+              <a:t>2/21/2026</a:t>
             </a:fld>
             <a:endParaRPr lang="en-US"/>
           </a:p>
@@ -678,7 +684,7 @@
           <a:p>
             <a:fld id="{42D3AED5-E26D-4E29-B1B3-7847B6779594}" type="datetime1">
               <a:rPr lang="en-US" smtClean="0"/>
-              <a:t>2/13/2026</a:t>
+              <a:t>2/21/2026</a:t>
             </a:fld>
             <a:endParaRPr lang="en-US"/>
           </a:p>
@@ -878,7 +884,7 @@
           <a:p>
             <a:fld id="{157B6794-849E-4626-908B-D15793550EFB}" type="datetime1">
               <a:rPr lang="en-US" smtClean="0"/>
-              <a:t>2/13/2026</a:t>
+              <a:t>2/21/2026</a:t>
             </a:fld>
             <a:endParaRPr lang="en-US"/>
           </a:p>
@@ -1154,7 +1160,7 @@
           <a:p>
             <a:fld id="{63DB64E7-5594-42A3-ADBF-E95A7ACEAD64}" type="datetime1">
               <a:rPr lang="en-US" smtClean="0"/>
-              <a:t>2/13/2026</a:t>
+              <a:t>2/21/2026</a:t>
             </a:fld>
             <a:endParaRPr lang="en-US"/>
           </a:p>
@@ -1427,7 +1433,7 @@
           <a:p>
             <a:fld id="{18462B0B-D248-4FFB-8695-AD7FA4B1284A}" type="datetime1">
               <a:rPr lang="en-US" smtClean="0"/>
-              <a:t>2/13/2026</a:t>
+              <a:t>2/21/2026</a:t>
             </a:fld>
             <a:endParaRPr lang="en-US"/>
           </a:p>
@@ -1850,7 +1856,7 @@
           <a:p>
             <a:fld id="{D0378EFB-9159-4510-B73F-4F0409ADE937}" type="datetime1">
               <a:rPr lang="en-US" smtClean="0"/>
-              <a:t>2/13/2026</a:t>
+              <a:t>2/21/2026</a:t>
             </a:fld>
             <a:endParaRPr lang="en-US"/>
           </a:p>
@@ -1992,7 +1998,7 @@
           <a:p>
             <a:fld id="{89BC9412-2452-4BED-A324-9D8C115361AD}" type="datetime1">
               <a:rPr lang="en-US" smtClean="0"/>
-              <a:t>2/13/2026</a:t>
+              <a:t>2/21/2026</a:t>
             </a:fld>
             <a:endParaRPr lang="en-US"/>
           </a:p>
@@ -2105,7 +2111,7 @@
           <a:p>
             <a:fld id="{F5318F62-D251-40E8-A23C-F4CFE9FEAB41}" type="datetime1">
               <a:rPr lang="en-US" smtClean="0"/>
-              <a:t>2/13/2026</a:t>
+              <a:t>2/21/2026</a:t>
             </a:fld>
             <a:endParaRPr lang="en-US"/>
           </a:p>
@@ -2418,7 +2424,7 @@
           <a:p>
             <a:fld id="{44F76144-149E-4874-93A5-554A0357CF82}" type="datetime1">
               <a:rPr lang="en-US" smtClean="0"/>
-              <a:t>2/13/2026</a:t>
+              <a:t>2/21/2026</a:t>
             </a:fld>
             <a:endParaRPr lang="en-US"/>
           </a:p>
@@ -2711,7 +2717,7 @@
           <a:p>
             <a:fld id="{50BA65D8-0540-4835-AE5C-25D29DBA01BE}" type="datetime1">
               <a:rPr lang="en-US" smtClean="0"/>
-              <a:t>2/13/2026</a:t>
+              <a:t>2/21/2026</a:t>
             </a:fld>
             <a:endParaRPr lang="en-US"/>
           </a:p>
@@ -2953,7 +2959,7 @@
           <a:p>
             <a:fld id="{E31BA835-12AC-4E8F-955A-EA3F4DE2791F}" type="datetime1">
               <a:rPr lang="en-US" smtClean="0"/>
-              <a:t>2/13/2026</a:t>
+              <a:t>2/21/2026</a:t>
             </a:fld>
             <a:endParaRPr lang="en-US"/>
           </a:p>
@@ -3768,6 +3774,307 @@
 </p:sld>
 </file>
 
+<file path=ppt/slides/slide10.xml><?xml version="1.0" encoding="utf-8"?>
+<p:sld xmlns:a="http://schemas.openxmlformats.org/drawingml/2006/main" xmlns:r="http://schemas.openxmlformats.org/officeDocument/2006/relationships" xmlns:p="http://schemas.openxmlformats.org/presentationml/2006/main">
+  <p:cSld>
+    <p:bg>
+      <p:bgPr>
+        <a:solidFill>
+          <a:schemeClr val="bg1"/>
+        </a:solidFill>
+        <a:effectLst/>
+      </p:bgPr>
+    </p:bg>
+    <p:spTree>
+      <p:nvGrpSpPr>
+        <p:cNvPr id="1" name="">
+          <a:extLst>
+            <a:ext uri="{FF2B5EF4-FFF2-40B4-BE49-F238E27FC236}">
+              <a16:creationId xmlns:a16="http://schemas.microsoft.com/office/drawing/2014/main" id="{55C3C86A-D8C4-88BF-2CEF-D0B8E44E76DC}"/>
+            </a:ext>
+          </a:extLst>
+        </p:cNvPr>
+        <p:cNvGrpSpPr/>
+        <p:nvPr/>
+      </p:nvGrpSpPr>
+      <p:grpSpPr>
+        <a:xfrm>
+          <a:off x="0" y="0"/>
+          <a:ext cx="0" cy="0"/>
+          <a:chOff x="0" y="0"/>
+          <a:chExt cx="0" cy="0"/>
+        </a:xfrm>
+      </p:grpSpPr>
+      <p:sp useBgFill="1">
+        <p:nvSpPr>
+          <p:cNvPr id="12" name="Rectangle 11">
+            <a:extLst>
+              <a:ext uri="{FF2B5EF4-FFF2-40B4-BE49-F238E27FC236}">
+                <a16:creationId xmlns:a16="http://schemas.microsoft.com/office/drawing/2014/main" id="{E49D7415-2F11-44C2-B6AA-13A25B6814B9}"/>
+              </a:ext>
+              <a:ext uri="{C183D7F6-B498-43B3-948B-1728B52AA6E4}">
+                <adec:decorative xmlns:adec="http://schemas.microsoft.com/office/drawing/2017/decorative" val="1"/>
+              </a:ext>
+            </a:extLst>
+          </p:cNvPr>
+          <p:cNvSpPr>
+            <a:spLocks noGrp="1" noRot="1" noChangeAspect="1" noMove="1" noResize="1" noEditPoints="1" noAdjustHandles="1" noChangeArrowheads="1" noChangeShapeType="1" noTextEdit="1"/>
+          </p:cNvSpPr>
+          <p:nvPr>
+            <p:extLst>
+              <p:ext uri="{386F3935-93C4-4BCD-93E2-E3B085C9AB24}">
+                <p16:designElem xmlns:p16="http://schemas.microsoft.com/office/powerpoint/2015/main" val="1"/>
+              </p:ext>
+            </p:extLst>
+          </p:nvPr>
+        </p:nvSpPr>
+        <p:spPr>
+          <a:xfrm>
+            <a:off x="0" y="0"/>
+            <a:ext cx="12192000" cy="6858000"/>
+          </a:xfrm>
+          <a:prstGeom prst="rect">
+            <a:avLst/>
+          </a:prstGeom>
+          <a:ln w="12700" cap="flat" cmpd="sng" algn="ctr">
+            <a:noFill/>
+            <a:prstDash val="solid"/>
+            <a:miter lim="800000"/>
+          </a:ln>
+          <a:effectLst/>
+          <a:extLst>
+            <a:ext uri="{91240B29-F687-4F45-9708-019B960494DF}">
+              <a14:hiddenLine xmlns:a14="http://schemas.microsoft.com/office/drawing/2010/main" w="12700" cap="flat" cmpd="sng" algn="ctr">
+                <a:solidFill>
+                  <a:schemeClr val="accent1">
+                    <a:shade val="50000"/>
+                  </a:schemeClr>
+                </a:solidFill>
+                <a:prstDash val="solid"/>
+                <a:miter lim="800000"/>
+              </a14:hiddenLine>
+            </a:ext>
+          </a:extLst>
+        </p:spPr>
+        <p:style>
+          <a:lnRef idx="2">
+            <a:schemeClr val="accent1">
+              <a:shade val="50000"/>
+            </a:schemeClr>
+          </a:lnRef>
+          <a:fillRef idx="1">
+            <a:schemeClr val="accent1"/>
+          </a:fillRef>
+          <a:effectRef idx="0">
+            <a:schemeClr val="accent1"/>
+          </a:effectRef>
+          <a:fontRef idx="minor">
+            <a:schemeClr val="lt1"/>
+          </a:fontRef>
+        </p:style>
+        <p:txBody>
+          <a:bodyPr rtlCol="0" anchor="ctr"/>
+          <a:lstStyle/>
+          <a:p>
+            <a:pPr algn="ctr"/>
+            <a:endParaRPr lang="en-US"/>
+          </a:p>
+        </p:txBody>
+      </p:sp>
+      <p:sp>
+        <p:nvSpPr>
+          <p:cNvPr id="2" name="Titre 1">
+            <a:extLst>
+              <a:ext uri="{FF2B5EF4-FFF2-40B4-BE49-F238E27FC236}">
+                <a16:creationId xmlns:a16="http://schemas.microsoft.com/office/drawing/2014/main" id="{5376D3CA-0545-EF33-2F00-3C8844A712D2}"/>
+              </a:ext>
+            </a:extLst>
+          </p:cNvPr>
+          <p:cNvSpPr>
+            <a:spLocks noGrp="1"/>
+          </p:cNvSpPr>
+          <p:nvPr>
+            <p:ph type="title"/>
+          </p:nvPr>
+        </p:nvSpPr>
+        <p:spPr>
+          <a:xfrm>
+            <a:off x="704088" y="914400"/>
+            <a:ext cx="3799763" cy="1473200"/>
+          </a:xfrm>
+        </p:spPr>
+        <p:txBody>
+          <a:bodyPr>
+            <a:normAutofit/>
+          </a:bodyPr>
+          <a:lstStyle/>
+          <a:p>
+            <a:r>
+              <a:rPr lang="fr-FR" sz="3600"/>
+              <a:t>Conclusion</a:t>
+            </a:r>
+          </a:p>
+        </p:txBody>
+      </p:sp>
+      <p:cxnSp>
+        <p:nvCxnSpPr>
+          <p:cNvPr id="14" name="Straight Connector 13">
+            <a:extLst>
+              <a:ext uri="{FF2B5EF4-FFF2-40B4-BE49-F238E27FC236}">
+                <a16:creationId xmlns:a16="http://schemas.microsoft.com/office/drawing/2014/main" id="{D2E57F3D-33BE-4306-87E6-245763719516}"/>
+              </a:ext>
+              <a:ext uri="{C183D7F6-B498-43B3-948B-1728B52AA6E4}">
+                <adec:decorative xmlns:adec="http://schemas.microsoft.com/office/drawing/2017/decorative" val="1"/>
+              </a:ext>
+            </a:extLst>
+          </p:cNvPr>
+          <p:cNvCxnSpPr>
+            <a:cxnSpLocks noGrp="1" noRot="1" noChangeAspect="1" noMove="1" noResize="1" noEditPoints="1" noAdjustHandles="1" noChangeArrowheads="1" noChangeShapeType="1"/>
+          </p:cNvCxnSpPr>
+          <p:nvPr>
+            <p:extLst>
+              <p:ext uri="{386F3935-93C4-4BCD-93E2-E3B085C9AB24}">
+                <p16:designElem xmlns:p16="http://schemas.microsoft.com/office/powerpoint/2015/main" val="1"/>
+              </p:ext>
+            </p:extLst>
+          </p:nvPr>
+        </p:nvCxnSpPr>
+        <p:spPr>
+          <a:xfrm>
+            <a:off x="804672" y="722376"/>
+            <a:ext cx="1638300" cy="0"/>
+          </a:xfrm>
+          <a:prstGeom prst="line">
+            <a:avLst/>
+          </a:prstGeom>
+          <a:ln w="44450">
+            <a:solidFill>
+              <a:schemeClr val="tx1"/>
+            </a:solidFill>
+          </a:ln>
+        </p:spPr>
+        <p:style>
+          <a:lnRef idx="1">
+            <a:schemeClr val="accent1"/>
+          </a:lnRef>
+          <a:fillRef idx="0">
+            <a:schemeClr val="accent1"/>
+          </a:fillRef>
+          <a:effectRef idx="0">
+            <a:schemeClr val="accent1"/>
+          </a:effectRef>
+          <a:fontRef idx="minor">
+            <a:schemeClr val="tx1"/>
+          </a:fontRef>
+        </p:style>
+      </p:cxnSp>
+      <p:sp>
+        <p:nvSpPr>
+          <p:cNvPr id="9" name="Content Placeholder 8">
+            <a:extLst>
+              <a:ext uri="{FF2B5EF4-FFF2-40B4-BE49-F238E27FC236}">
+                <a16:creationId xmlns:a16="http://schemas.microsoft.com/office/drawing/2014/main" id="{70741EC4-4012-4473-B504-168C3994C3FF}"/>
+              </a:ext>
+            </a:extLst>
+          </p:cNvPr>
+          <p:cNvSpPr>
+            <a:spLocks noGrp="1"/>
+          </p:cNvSpPr>
+          <p:nvPr>
+            <p:ph idx="1"/>
+          </p:nvPr>
+        </p:nvSpPr>
+        <p:spPr>
+          <a:xfrm>
+            <a:off x="704088" y="2387600"/>
+            <a:ext cx="3799763" cy="3767328"/>
+          </a:xfrm>
+        </p:spPr>
+        <p:txBody>
+          <a:bodyPr>
+            <a:normAutofit lnSpcReduction="10000"/>
+          </a:bodyPr>
+          <a:lstStyle/>
+          <a:p>
+            <a:pPr marL="0" indent="0">
+              <a:buNone/>
+            </a:pPr>
+            <a:endParaRPr lang="en-US" dirty="0"/>
+          </a:p>
+          <a:p>
+            <a:r>
+              <a:rPr lang="en-US" dirty="0"/>
+              <a:t>It has potential in the long term , specially if the lithium prices keep climbing or stable</a:t>
+            </a:r>
+          </a:p>
+          <a:p>
+            <a:endParaRPr lang="en-US" dirty="0"/>
+          </a:p>
+          <a:p>
+            <a:r>
+              <a:rPr lang="en-US" dirty="0"/>
+              <a:t>They are biased , because the dividends are low (DDM), and the </a:t>
+            </a:r>
+            <a:r>
+              <a:rPr lang="en-US" dirty="0" err="1"/>
+              <a:t>wacc</a:t>
+            </a:r>
+            <a:r>
+              <a:rPr lang="en-US" dirty="0"/>
+              <a:t> with the EV/SALES are this year higher than average</a:t>
+            </a:r>
+          </a:p>
+        </p:txBody>
+      </p:sp>
+      <p:pic>
+        <p:nvPicPr>
+          <p:cNvPr id="4" name="Image 3" descr="Une image contenant texte, capture d’écran, diagramme, Tracé&#10;&#10;Le contenu généré par l’IA peut être incorrect.">
+            <a:extLst>
+              <a:ext uri="{FF2B5EF4-FFF2-40B4-BE49-F238E27FC236}">
+                <a16:creationId xmlns:a16="http://schemas.microsoft.com/office/drawing/2014/main" id="{B21E8155-B3A5-D979-E8BC-1949804B113E}"/>
+              </a:ext>
+            </a:extLst>
+          </p:cNvPr>
+          <p:cNvPicPr>
+            <a:picLocks noChangeAspect="1"/>
+          </p:cNvPicPr>
+          <p:nvPr/>
+        </p:nvPicPr>
+        <p:blipFill>
+          <a:blip r:embed="rId2">
+            <a:extLst>
+              <a:ext uri="{28A0092B-C50C-407E-A947-70E740481C1C}">
+                <a14:useLocalDpi xmlns:a14="http://schemas.microsoft.com/office/drawing/2010/main" val="0"/>
+              </a:ext>
+            </a:extLst>
+          </a:blip>
+          <a:stretch>
+            <a:fillRect/>
+          </a:stretch>
+        </p:blipFill>
+        <p:spPr>
+          <a:xfrm>
+            <a:off x="4554533" y="1160207"/>
+            <a:ext cx="7637467" cy="5697794"/>
+          </a:xfrm>
+          <a:prstGeom prst="rect">
+            <a:avLst/>
+          </a:prstGeom>
+        </p:spPr>
+      </p:pic>
+    </p:spTree>
+    <p:extLst>
+      <p:ext uri="{BB962C8B-B14F-4D97-AF65-F5344CB8AC3E}">
+        <p14:creationId xmlns:p14="http://schemas.microsoft.com/office/powerpoint/2010/main" val="608762126"/>
+      </p:ext>
+    </p:extLst>
+  </p:cSld>
+  <p:clrMapOvr>
+    <a:masterClrMapping/>
+  </p:clrMapOvr>
+</p:sld>
+</file>
+
 <file path=ppt/slides/slide2.xml><?xml version="1.0" encoding="utf-8"?>
 <p:sld xmlns:a="http://schemas.openxmlformats.org/drawingml/2006/main" xmlns:r="http://schemas.openxmlformats.org/officeDocument/2006/relationships" xmlns:p="http://schemas.openxmlformats.org/presentationml/2006/main">
   <p:cSld>
@@ -4870,7 +5177,7 @@
           <a:p>
             <a:r>
               <a:rPr lang="en-US" dirty="0"/>
-              <a:t>Sources from INSEE and yahoo finance</a:t>
+              <a:t>Sources from INSEE (commodity) and yahoo finance</a:t>
             </a:r>
           </a:p>
           <a:p>
@@ -5189,10 +5496,10 @@
       </p:sp>
       <p:pic>
         <p:nvPicPr>
-          <p:cNvPr id="5" name="Espace réservé du contenu 4" descr="Une image contenant capture d’écran, diagramme&#10;&#10;Le contenu généré par l’IA peut être incorrect.">
-            <a:extLst>
-              <a:ext uri="{FF2B5EF4-FFF2-40B4-BE49-F238E27FC236}">
-                <a16:creationId xmlns:a16="http://schemas.microsoft.com/office/drawing/2014/main" id="{614C9B45-C303-BBC7-9D57-CC9F12660D11}"/>
+          <p:cNvPr id="4" name="Image 3" descr="Une image contenant texte, ligne, Tracé, diagramme&#10;&#10;Le contenu généré par l’IA peut être incorrect.">
+            <a:extLst>
+              <a:ext uri="{FF2B5EF4-FFF2-40B4-BE49-F238E27FC236}">
+                <a16:creationId xmlns:a16="http://schemas.microsoft.com/office/drawing/2014/main" id="{1070B4A3-2B61-D80F-A2D0-509BFB68C90C}"/>
               </a:ext>
             </a:extLst>
           </p:cNvPr>
@@ -5209,15 +5516,14 @@
               </a:ext>
             </a:extLst>
           </a:blip>
-          <a:srcRect l="6842" r="3584" b="-4"/>
           <a:stretch>
             <a:fillRect/>
           </a:stretch>
         </p:blipFill>
         <p:spPr>
           <a:xfrm>
-            <a:off x="4981575" y="735286"/>
-            <a:ext cx="6495042" cy="5419642"/>
+            <a:off x="4516582" y="1463429"/>
+            <a:ext cx="7662687" cy="3419863"/>
           </a:xfrm>
           <a:prstGeom prst="rect">
             <a:avLst/>
@@ -5573,13 +5879,7 @@
     </p:bg>
     <p:spTree>
       <p:nvGrpSpPr>
-        <p:cNvPr id="1" name="">
-          <a:extLst>
-            <a:ext uri="{FF2B5EF4-FFF2-40B4-BE49-F238E27FC236}">
-              <a16:creationId xmlns:a16="http://schemas.microsoft.com/office/drawing/2014/main" id="{376B6BB8-BFDF-B9F9-69C8-A1192B0F4E0C}"/>
-            </a:ext>
-          </a:extLst>
-        </p:cNvPr>
+        <p:cNvPr id="1" name=""/>
         <p:cNvGrpSpPr/>
         <p:nvPr/>
       </p:nvGrpSpPr>
@@ -5593,7 +5893,7 @@
       </p:grpSpPr>
       <p:sp useBgFill="1">
         <p:nvSpPr>
-          <p:cNvPr id="18" name="Rectangle 17">
+          <p:cNvPr id="15" name="Rectangle 14">
             <a:extLst>
               <a:ext uri="{FF2B5EF4-FFF2-40B4-BE49-F238E27FC236}">
                 <a16:creationId xmlns:a16="http://schemas.microsoft.com/office/drawing/2014/main" id="{E49D7415-2F11-44C2-B6AA-13A25B6814B9}"/>
@@ -5672,7 +5972,7 @@
           <p:cNvPr id="2" name="Titre 1">
             <a:extLst>
               <a:ext uri="{FF2B5EF4-FFF2-40B4-BE49-F238E27FC236}">
-                <a16:creationId xmlns:a16="http://schemas.microsoft.com/office/drawing/2014/main" id="{66E8CC68-BD57-B828-AD86-225BE5A94E8B}"/>
+                <a16:creationId xmlns:a16="http://schemas.microsoft.com/office/drawing/2014/main" id="{900F657A-37B6-F613-99B0-DB2A072CCDB7}"/>
               </a:ext>
             </a:extLst>
           </p:cNvPr>
@@ -5685,41 +5985,34 @@
         </p:nvSpPr>
         <p:spPr>
           <a:xfrm>
-            <a:off x="704088" y="914400"/>
-            <a:ext cx="10780776" cy="1180210"/>
-          </a:xfrm>
-        </p:spPr>
-        <p:txBody>
-          <a:bodyPr>
+            <a:off x="704089" y="914400"/>
+            <a:ext cx="3453844" cy="1463040"/>
+          </a:xfrm>
+        </p:spPr>
+        <p:txBody>
+          <a:bodyPr anchor="t">
             <a:normAutofit/>
           </a:bodyPr>
           <a:lstStyle/>
           <a:p>
             <a:r>
-              <a:rPr lang="fr-FR" dirty="0" err="1"/>
-              <a:t>Forecasts</a:t>
-            </a:r>
-            <a:r>
-              <a:rPr lang="fr-FR" dirty="0"/>
-              <a:t> (</a:t>
-            </a:r>
-            <a:r>
-              <a:rPr lang="fr-FR" dirty="0" err="1"/>
-              <a:t>regression</a:t>
-            </a:r>
-            <a:r>
-              <a:rPr lang="fr-FR" dirty="0"/>
-              <a:t>) </a:t>
-            </a:r>
+              <a:rPr lang="fr-FR" dirty="0"/>
+              <a:t>OLS ( 3 factor vs </a:t>
+            </a:r>
+            <a:r>
+              <a:rPr lang="fr-FR"/>
+              <a:t>2 factor)</a:t>
+            </a:r>
+            <a:endParaRPr lang="fr-FR" dirty="0"/>
           </a:p>
         </p:txBody>
       </p:sp>
       <p:cxnSp>
         <p:nvCxnSpPr>
-          <p:cNvPr id="20" name="Straight Connector 19">
-            <a:extLst>
-              <a:ext uri="{FF2B5EF4-FFF2-40B4-BE49-F238E27FC236}">
-                <a16:creationId xmlns:a16="http://schemas.microsoft.com/office/drawing/2014/main" id="{4E495065-8864-87FB-2BCC-254769963EA4}"/>
+          <p:cNvPr id="17" name="Straight Connector 16">
+            <a:extLst>
+              <a:ext uri="{FF2B5EF4-FFF2-40B4-BE49-F238E27FC236}">
+                <a16:creationId xmlns:a16="http://schemas.microsoft.com/office/drawing/2014/main" id="{A7C10D4C-8DED-200E-3237-3345F3F2A188}"/>
               </a:ext>
               <a:ext uri="{C183D7F6-B498-43B3-948B-1728B52AA6E4}">
                 <adec:decorative xmlns:adec="http://schemas.microsoft.com/office/drawing/2017/decorative" val="1"/>
@@ -5739,13 +6032,100 @@
         </p:nvCxnSpPr>
         <p:spPr>
           <a:xfrm>
-            <a:off x="804672" y="722376"/>
-            <a:ext cx="1638300" cy="0"/>
+            <a:off x="804672" y="723900"/>
+            <a:ext cx="10588752" cy="0"/>
           </a:xfrm>
           <a:prstGeom prst="line">
             <a:avLst/>
           </a:prstGeom>
           <a:ln w="44450">
+            <a:solidFill>
+              <a:schemeClr val="tx1"/>
+            </a:solidFill>
+          </a:ln>
+        </p:spPr>
+        <p:style>
+          <a:lnRef idx="1">
+            <a:schemeClr val="accent1"/>
+          </a:lnRef>
+          <a:fillRef idx="0">
+            <a:schemeClr val="accent1"/>
+          </a:fillRef>
+          <a:effectRef idx="0">
+            <a:schemeClr val="accent1"/>
+          </a:effectRef>
+          <a:fontRef idx="minor">
+            <a:schemeClr val="tx1"/>
+          </a:fontRef>
+        </p:style>
+      </p:cxnSp>
+      <p:sp>
+        <p:nvSpPr>
+          <p:cNvPr id="12" name="Content Placeholder 11">
+            <a:extLst>
+              <a:ext uri="{FF2B5EF4-FFF2-40B4-BE49-F238E27FC236}">
+                <a16:creationId xmlns:a16="http://schemas.microsoft.com/office/drawing/2014/main" id="{514DBB5A-109E-C312-13B5-CD4377C62E36}"/>
+              </a:ext>
+            </a:extLst>
+          </p:cNvPr>
+          <p:cNvSpPr>
+            <a:spLocks noGrp="1"/>
+          </p:cNvSpPr>
+          <p:nvPr>
+            <p:ph idx="1"/>
+          </p:nvPr>
+        </p:nvSpPr>
+        <p:spPr>
+          <a:xfrm>
+            <a:off x="4862022" y="1014984"/>
+            <a:ext cx="6614593" cy="1362456"/>
+          </a:xfrm>
+        </p:spPr>
+        <p:txBody>
+          <a:bodyPr anchor="t">
+            <a:normAutofit/>
+          </a:bodyPr>
+          <a:lstStyle/>
+          <a:p>
+            <a:r>
+              <a:rPr lang="en-US" dirty="0"/>
+              <a:t>As you can see the best model was the 2 factor one , which explains +- half of the returns.</a:t>
+            </a:r>
+          </a:p>
+        </p:txBody>
+      </p:sp>
+      <p:cxnSp>
+        <p:nvCxnSpPr>
+          <p:cNvPr id="19" name="Straight Connector 18">
+            <a:extLst>
+              <a:ext uri="{FF2B5EF4-FFF2-40B4-BE49-F238E27FC236}">
+                <a16:creationId xmlns:a16="http://schemas.microsoft.com/office/drawing/2014/main" id="{E8F7F80F-9EDD-0EEA-B6D7-E116EBA4FAD2}"/>
+              </a:ext>
+              <a:ext uri="{C183D7F6-B498-43B3-948B-1728B52AA6E4}">
+                <adec:decorative xmlns:adec="http://schemas.microsoft.com/office/drawing/2017/decorative" val="1"/>
+              </a:ext>
+            </a:extLst>
+          </p:cNvPr>
+          <p:cNvCxnSpPr>
+            <a:cxnSpLocks noGrp="1" noRot="1" noChangeAspect="1" noMove="1" noResize="1" noEditPoints="1" noAdjustHandles="1" noChangeArrowheads="1" noChangeShapeType="1"/>
+          </p:cNvCxnSpPr>
+          <p:nvPr>
+            <p:extLst>
+              <p:ext uri="{386F3935-93C4-4BCD-93E2-E3B085C9AB24}">
+                <p16:designElem xmlns:p16="http://schemas.microsoft.com/office/powerpoint/2015/main" val="1"/>
+              </p:ext>
+            </p:extLst>
+          </p:nvPr>
+        </p:nvCxnSpPr>
+        <p:spPr>
+          <a:xfrm>
+            <a:off x="809065" y="2497143"/>
+            <a:ext cx="10582835" cy="0"/>
+          </a:xfrm>
+          <a:prstGeom prst="line">
+            <a:avLst/>
+          </a:prstGeom>
+          <a:ln w="12700">
             <a:solidFill>
               <a:schemeClr val="tx1"/>
             </a:solidFill>
@@ -5768,10 +6148,10 @@
       </p:cxnSp>
       <p:pic>
         <p:nvPicPr>
-          <p:cNvPr id="11" name="Espace réservé du contenu 10" descr="Une image contenant texte, Tracé, capture d’écran, ligne&#10;&#10;Le contenu généré par l’IA peut être incorrect.">
-            <a:extLst>
-              <a:ext uri="{FF2B5EF4-FFF2-40B4-BE49-F238E27FC236}">
-                <a16:creationId xmlns:a16="http://schemas.microsoft.com/office/drawing/2014/main" id="{1FD4442E-7AE3-83C7-4C52-8C23325714F8}"/>
+          <p:cNvPr id="10" name="Image 9" descr="Une image contenant texte, capture d’écran, Police, nombre&#10;&#10;Le contenu généré par l’IA peut être incorrect.">
+            <a:extLst>
+              <a:ext uri="{FF2B5EF4-FFF2-40B4-BE49-F238E27FC236}">
+                <a16:creationId xmlns:a16="http://schemas.microsoft.com/office/drawing/2014/main" id="{326C51EE-5786-5353-3E2C-6C008CB2B485}"/>
               </a:ext>
             </a:extLst>
           </p:cNvPr>
@@ -5794,20 +6174,239 @@
         </p:blipFill>
         <p:spPr>
           <a:xfrm>
-            <a:off x="1152286" y="2286633"/>
-            <a:ext cx="4845525" cy="3876421"/>
+            <a:off x="0" y="4134915"/>
+            <a:ext cx="12192000" cy="2723086"/>
           </a:xfrm>
           <a:prstGeom prst="rect">
             <a:avLst/>
           </a:prstGeom>
         </p:spPr>
       </p:pic>
+    </p:spTree>
+    <p:extLst>
+      <p:ext uri="{BB962C8B-B14F-4D97-AF65-F5344CB8AC3E}">
+        <p14:creationId xmlns:p14="http://schemas.microsoft.com/office/powerpoint/2010/main" val="3178733149"/>
+      </p:ext>
+    </p:extLst>
+  </p:cSld>
+  <p:clrMapOvr>
+    <a:masterClrMapping/>
+  </p:clrMapOvr>
+</p:sld>
+</file>
+
+<file path=ppt/slides/slide8.xml><?xml version="1.0" encoding="utf-8"?>
+<p:sld xmlns:a="http://schemas.openxmlformats.org/drawingml/2006/main" xmlns:r="http://schemas.openxmlformats.org/officeDocument/2006/relationships" xmlns:p="http://schemas.openxmlformats.org/presentationml/2006/main">
+  <p:cSld>
+    <p:bg>
+      <p:bgPr>
+        <a:solidFill>
+          <a:schemeClr val="bg1"/>
+        </a:solidFill>
+        <a:effectLst/>
+      </p:bgPr>
+    </p:bg>
+    <p:spTree>
+      <p:nvGrpSpPr>
+        <p:cNvPr id="1" name="">
+          <a:extLst>
+            <a:ext uri="{FF2B5EF4-FFF2-40B4-BE49-F238E27FC236}">
+              <a16:creationId xmlns:a16="http://schemas.microsoft.com/office/drawing/2014/main" id="{376B6BB8-BFDF-B9F9-69C8-A1192B0F4E0C}"/>
+            </a:ext>
+          </a:extLst>
+        </p:cNvPr>
+        <p:cNvGrpSpPr/>
+        <p:nvPr/>
+      </p:nvGrpSpPr>
+      <p:grpSpPr>
+        <a:xfrm>
+          <a:off x="0" y="0"/>
+          <a:ext cx="0" cy="0"/>
+          <a:chOff x="0" y="0"/>
+          <a:chExt cx="0" cy="0"/>
+        </a:xfrm>
+      </p:grpSpPr>
+      <p:sp useBgFill="1">
+        <p:nvSpPr>
+          <p:cNvPr id="18" name="Rectangle 17">
+            <a:extLst>
+              <a:ext uri="{FF2B5EF4-FFF2-40B4-BE49-F238E27FC236}">
+                <a16:creationId xmlns:a16="http://schemas.microsoft.com/office/drawing/2014/main" id="{E49D7415-2F11-44C2-B6AA-13A25B6814B9}"/>
+              </a:ext>
+              <a:ext uri="{C183D7F6-B498-43B3-948B-1728B52AA6E4}">
+                <adec:decorative xmlns:adec="http://schemas.microsoft.com/office/drawing/2017/decorative" val="1"/>
+              </a:ext>
+            </a:extLst>
+          </p:cNvPr>
+          <p:cNvSpPr>
+            <a:spLocks noGrp="1" noRot="1" noChangeAspect="1" noMove="1" noResize="1" noEditPoints="1" noAdjustHandles="1" noChangeArrowheads="1" noChangeShapeType="1" noTextEdit="1"/>
+          </p:cNvSpPr>
+          <p:nvPr>
+            <p:extLst>
+              <p:ext uri="{386F3935-93C4-4BCD-93E2-E3B085C9AB24}">
+                <p16:designElem xmlns:p16="http://schemas.microsoft.com/office/powerpoint/2015/main" val="1"/>
+              </p:ext>
+            </p:extLst>
+          </p:nvPr>
+        </p:nvSpPr>
+        <p:spPr>
+          <a:xfrm>
+            <a:off x="0" y="0"/>
+            <a:ext cx="12192000" cy="6858000"/>
+          </a:xfrm>
+          <a:prstGeom prst="rect">
+            <a:avLst/>
+          </a:prstGeom>
+          <a:ln w="12700" cap="flat" cmpd="sng" algn="ctr">
+            <a:noFill/>
+            <a:prstDash val="solid"/>
+            <a:miter lim="800000"/>
+          </a:ln>
+          <a:effectLst/>
+          <a:extLst>
+            <a:ext uri="{91240B29-F687-4F45-9708-019B960494DF}">
+              <a14:hiddenLine xmlns:a14="http://schemas.microsoft.com/office/drawing/2010/main" w="12700" cap="flat" cmpd="sng" algn="ctr">
+                <a:solidFill>
+                  <a:schemeClr val="accent1">
+                    <a:shade val="50000"/>
+                  </a:schemeClr>
+                </a:solidFill>
+                <a:prstDash val="solid"/>
+                <a:miter lim="800000"/>
+              </a14:hiddenLine>
+            </a:ext>
+          </a:extLst>
+        </p:spPr>
+        <p:style>
+          <a:lnRef idx="2">
+            <a:schemeClr val="accent1">
+              <a:shade val="50000"/>
+            </a:schemeClr>
+          </a:lnRef>
+          <a:fillRef idx="1">
+            <a:schemeClr val="accent1"/>
+          </a:fillRef>
+          <a:effectRef idx="0">
+            <a:schemeClr val="accent1"/>
+          </a:effectRef>
+          <a:fontRef idx="minor">
+            <a:schemeClr val="lt1"/>
+          </a:fontRef>
+        </p:style>
+        <p:txBody>
+          <a:bodyPr rtlCol="0" anchor="ctr"/>
+          <a:lstStyle/>
+          <a:p>
+            <a:pPr algn="ctr"/>
+            <a:endParaRPr lang="en-US"/>
+          </a:p>
+        </p:txBody>
+      </p:sp>
+      <p:sp>
+        <p:nvSpPr>
+          <p:cNvPr id="2" name="Titre 1">
+            <a:extLst>
+              <a:ext uri="{FF2B5EF4-FFF2-40B4-BE49-F238E27FC236}">
+                <a16:creationId xmlns:a16="http://schemas.microsoft.com/office/drawing/2014/main" id="{66E8CC68-BD57-B828-AD86-225BE5A94E8B}"/>
+              </a:ext>
+            </a:extLst>
+          </p:cNvPr>
+          <p:cNvSpPr>
+            <a:spLocks noGrp="1"/>
+          </p:cNvSpPr>
+          <p:nvPr>
+            <p:ph type="title"/>
+          </p:nvPr>
+        </p:nvSpPr>
+        <p:spPr>
+          <a:xfrm>
+            <a:off x="704088" y="914400"/>
+            <a:ext cx="10780776" cy="1180210"/>
+          </a:xfrm>
+        </p:spPr>
+        <p:txBody>
+          <a:bodyPr>
+            <a:normAutofit/>
+          </a:bodyPr>
+          <a:lstStyle/>
+          <a:p>
+            <a:r>
+              <a:rPr lang="fr-FR" dirty="0" err="1"/>
+              <a:t>Forecasts</a:t>
+            </a:r>
+            <a:r>
+              <a:rPr lang="fr-FR" dirty="0"/>
+              <a:t> (</a:t>
+            </a:r>
+            <a:r>
+              <a:rPr lang="fr-FR" dirty="0" err="1"/>
+              <a:t>montecarlo</a:t>
+            </a:r>
+            <a:r>
+              <a:rPr lang="fr-FR" dirty="0"/>
+              <a:t>) </a:t>
+            </a:r>
+          </a:p>
+        </p:txBody>
+      </p:sp>
+      <p:cxnSp>
+        <p:nvCxnSpPr>
+          <p:cNvPr id="20" name="Straight Connector 19">
+            <a:extLst>
+              <a:ext uri="{FF2B5EF4-FFF2-40B4-BE49-F238E27FC236}">
+                <a16:creationId xmlns:a16="http://schemas.microsoft.com/office/drawing/2014/main" id="{4E495065-8864-87FB-2BCC-254769963EA4}"/>
+              </a:ext>
+              <a:ext uri="{C183D7F6-B498-43B3-948B-1728B52AA6E4}">
+                <adec:decorative xmlns:adec="http://schemas.microsoft.com/office/drawing/2017/decorative" val="1"/>
+              </a:ext>
+            </a:extLst>
+          </p:cNvPr>
+          <p:cNvCxnSpPr>
+            <a:cxnSpLocks noGrp="1" noRot="1" noChangeAspect="1" noMove="1" noResize="1" noEditPoints="1" noAdjustHandles="1" noChangeArrowheads="1" noChangeShapeType="1"/>
+          </p:cNvCxnSpPr>
+          <p:nvPr>
+            <p:extLst>
+              <p:ext uri="{386F3935-93C4-4BCD-93E2-E3B085C9AB24}">
+                <p16:designElem xmlns:p16="http://schemas.microsoft.com/office/powerpoint/2015/main" val="1"/>
+              </p:ext>
+            </p:extLst>
+          </p:nvPr>
+        </p:nvCxnSpPr>
+        <p:spPr>
+          <a:xfrm>
+            <a:off x="804672" y="722376"/>
+            <a:ext cx="1638300" cy="0"/>
+          </a:xfrm>
+          <a:prstGeom prst="line">
+            <a:avLst/>
+          </a:prstGeom>
+          <a:ln w="44450">
+            <a:solidFill>
+              <a:schemeClr val="tx1"/>
+            </a:solidFill>
+          </a:ln>
+        </p:spPr>
+        <p:style>
+          <a:lnRef idx="1">
+            <a:schemeClr val="accent1"/>
+          </a:lnRef>
+          <a:fillRef idx="0">
+            <a:schemeClr val="accent1"/>
+          </a:fillRef>
+          <a:effectRef idx="0">
+            <a:schemeClr val="accent1"/>
+          </a:effectRef>
+          <a:fontRef idx="minor">
+            <a:schemeClr val="tx1"/>
+          </a:fontRef>
+        </p:style>
+      </p:cxnSp>
       <p:pic>
         <p:nvPicPr>
-          <p:cNvPr id="13" name="Espace réservé du contenu 12" descr="Une image contenant texte, diagramme, Tracé, capture d’écran&#10;&#10;Le contenu généré par l’IA peut être incorrect.">
-            <a:extLst>
-              <a:ext uri="{FF2B5EF4-FFF2-40B4-BE49-F238E27FC236}">
-                <a16:creationId xmlns:a16="http://schemas.microsoft.com/office/drawing/2014/main" id="{87CB7530-6C76-3C0B-0A16-9F6662D2C7AE}"/>
+          <p:cNvPr id="6" name="Espace réservé du contenu 5" descr="Une image contenant diagramme, Tracé, texte, ligne">
+            <a:extLst>
+              <a:ext uri="{FF2B5EF4-FFF2-40B4-BE49-F238E27FC236}">
+                <a16:creationId xmlns:a16="http://schemas.microsoft.com/office/drawing/2014/main" id="{8FC1A24B-C8EF-651D-D53F-82331B7D8799}"/>
               </a:ext>
             </a:extLst>
           </p:cNvPr>
@@ -5819,7 +6418,7 @@
           </p:nvPr>
         </p:nvPicPr>
         <p:blipFill>
-          <a:blip r:embed="rId3">
+          <a:blip r:embed="rId2">
             <a:extLst>
               <a:ext uri="{28A0092B-C50C-407E-A947-70E740481C1C}">
                 <a14:useLocalDpi xmlns:a14="http://schemas.microsoft.com/office/drawing/2010/main" val="0"/>
@@ -5832,8 +6431,44 @@
         </p:blipFill>
         <p:spPr>
           <a:xfrm>
-            <a:off x="6664325" y="2420436"/>
-            <a:ext cx="4821238" cy="3628440"/>
+            <a:off x="5830528" y="2094611"/>
+            <a:ext cx="6361471" cy="4763390"/>
+          </a:xfrm>
+          <a:prstGeom prst="rect">
+            <a:avLst/>
+          </a:prstGeom>
+        </p:spPr>
+      </p:pic>
+      <p:pic>
+        <p:nvPicPr>
+          <p:cNvPr id="8" name="Image 7" descr="Une image contenant diagramme, Tracé, ligne, texte&#10;&#10;Le contenu généré par l’IA peut être incorrect.">
+            <a:extLst>
+              <a:ext uri="{FF2B5EF4-FFF2-40B4-BE49-F238E27FC236}">
+                <a16:creationId xmlns:a16="http://schemas.microsoft.com/office/drawing/2014/main" id="{1300480A-8141-7290-35ED-614AF0E98EA0}"/>
+              </a:ext>
+            </a:extLst>
+          </p:cNvPr>
+          <p:cNvPicPr>
+            <a:picLocks noChangeAspect="1"/>
+          </p:cNvPicPr>
+          <p:nvPr/>
+        </p:nvPicPr>
+        <p:blipFill>
+          <a:blip r:embed="rId3">
+            <a:extLst>
+              <a:ext uri="{28A0092B-C50C-407E-A947-70E740481C1C}">
+                <a14:useLocalDpi xmlns:a14="http://schemas.microsoft.com/office/drawing/2010/main" val="0"/>
+              </a:ext>
+            </a:extLst>
+          </a:blip>
+          <a:stretch>
+            <a:fillRect/>
+          </a:stretch>
+        </p:blipFill>
+        <p:spPr>
+          <a:xfrm>
+            <a:off x="0" y="2094610"/>
+            <a:ext cx="5887518" cy="4763390"/>
           </a:xfrm>
           <a:prstGeom prst="rect">
             <a:avLst/>
@@ -5853,7 +6488,7 @@
 </p:sld>
 </file>
 
-<file path=ppt/slides/slide8.xml><?xml version="1.0" encoding="utf-8"?>
+<file path=ppt/slides/slide9.xml><?xml version="1.0" encoding="utf-8"?>
 <p:sld xmlns:a="http://schemas.openxmlformats.org/drawingml/2006/main" xmlns:r="http://schemas.openxmlformats.org/officeDocument/2006/relationships" xmlns:p="http://schemas.openxmlformats.org/presentationml/2006/main">
   <p:cSld>
     <p:bg>
@@ -6197,7 +6832,6 @@
               <a:rPr lang="fr-FR" dirty="0"/>
               <a:t>.</a:t>
             </a:r>
-            <a:endParaRPr lang="fr-FR"/>
           </a:p>
           <a:p>
             <a:pPr>
@@ -6205,7 +6839,7 @@
                 <a:spcPct val="100000"/>
               </a:lnSpc>
             </a:pPr>
-            <a:endParaRPr lang="fr-FR"/>
+            <a:endParaRPr lang="fr-FR" dirty="0"/>
           </a:p>
           <a:p>
             <a:pPr>
@@ -6229,7 +6863,6 @@
               <a:rPr lang="fr-FR" dirty="0"/>
               <a:t> a RF= 4% (Chilean bonds)</a:t>
             </a:r>
-            <a:endParaRPr lang="fr-FR"/>
           </a:p>
           <a:p>
             <a:pPr>
@@ -6237,7 +6870,7 @@
                 <a:spcPct val="100000"/>
               </a:lnSpc>
             </a:pPr>
-            <a:endParaRPr lang="fr-FR"/>
+            <a:endParaRPr lang="fr-FR" dirty="0"/>
           </a:p>
           <a:p>
             <a:pPr>
@@ -6257,7 +6890,6 @@
               <a:rPr lang="fr-FR" dirty="0"/>
               <a:t> PIB)</a:t>
             </a:r>
-            <a:endParaRPr lang="fr-FR"/>
           </a:p>
           <a:p>
             <a:pPr>
@@ -6265,7 +6897,7 @@
                 <a:spcPct val="100000"/>
               </a:lnSpc>
             </a:pPr>
-            <a:endParaRPr lang="fr-FR"/>
+            <a:endParaRPr lang="fr-FR" dirty="0"/>
           </a:p>
           <a:p>
             <a:pPr>
@@ -6291,7 +6923,15 @@
             </a:r>
             <a:r>
               <a:rPr lang="fr-FR" dirty="0"/>
-              <a:t> of the FCFF </a:t>
+              <a:t> (</a:t>
+            </a:r>
+            <a:r>
+              <a:rPr lang="fr-FR" dirty="0" err="1"/>
+              <a:t>factset</a:t>
+            </a:r>
+            <a:r>
+              <a:rPr lang="fr-FR" dirty="0"/>
+              <a:t>) of the FCFF </a:t>
             </a:r>
             <a:r>
               <a:rPr lang="fr-FR" dirty="0" err="1"/>
@@ -6329,7 +6969,7 @@
               <a:rPr lang="fr-FR" dirty="0" err="1"/>
               <a:t>yet</a:t>
             </a:r>
-            <a:endParaRPr lang="fr-FR"/>
+            <a:endParaRPr lang="fr-FR" dirty="0"/>
           </a:p>
         </p:txBody>
       </p:sp>
@@ -6389,303 +7029,6 @@
     <p:extLst>
       <p:ext uri="{BB962C8B-B14F-4D97-AF65-F5344CB8AC3E}">
         <p14:creationId xmlns:p14="http://schemas.microsoft.com/office/powerpoint/2010/main" val="3615499468"/>
-      </p:ext>
-    </p:extLst>
-  </p:cSld>
-  <p:clrMapOvr>
-    <a:masterClrMapping/>
-  </p:clrMapOvr>
-</p:sld>
-</file>
-
-<file path=ppt/slides/slide9.xml><?xml version="1.0" encoding="utf-8"?>
-<p:sld xmlns:a="http://schemas.openxmlformats.org/drawingml/2006/main" xmlns:r="http://schemas.openxmlformats.org/officeDocument/2006/relationships" xmlns:p="http://schemas.openxmlformats.org/presentationml/2006/main">
-  <p:cSld>
-    <p:bg>
-      <p:bgPr>
-        <a:solidFill>
-          <a:schemeClr val="bg1"/>
-        </a:solidFill>
-        <a:effectLst/>
-      </p:bgPr>
-    </p:bg>
-    <p:spTree>
-      <p:nvGrpSpPr>
-        <p:cNvPr id="1" name="">
-          <a:extLst>
-            <a:ext uri="{FF2B5EF4-FFF2-40B4-BE49-F238E27FC236}">
-              <a16:creationId xmlns:a16="http://schemas.microsoft.com/office/drawing/2014/main" id="{55C3C86A-D8C4-88BF-2CEF-D0B8E44E76DC}"/>
-            </a:ext>
-          </a:extLst>
-        </p:cNvPr>
-        <p:cNvGrpSpPr/>
-        <p:nvPr/>
-      </p:nvGrpSpPr>
-      <p:grpSpPr>
-        <a:xfrm>
-          <a:off x="0" y="0"/>
-          <a:ext cx="0" cy="0"/>
-          <a:chOff x="0" y="0"/>
-          <a:chExt cx="0" cy="0"/>
-        </a:xfrm>
-      </p:grpSpPr>
-      <p:sp useBgFill="1">
-        <p:nvSpPr>
-          <p:cNvPr id="12" name="Rectangle 11">
-            <a:extLst>
-              <a:ext uri="{FF2B5EF4-FFF2-40B4-BE49-F238E27FC236}">
-                <a16:creationId xmlns:a16="http://schemas.microsoft.com/office/drawing/2014/main" id="{E49D7415-2F11-44C2-B6AA-13A25B6814B9}"/>
-              </a:ext>
-              <a:ext uri="{C183D7F6-B498-43B3-948B-1728B52AA6E4}">
-                <adec:decorative xmlns:adec="http://schemas.microsoft.com/office/drawing/2017/decorative" val="1"/>
-              </a:ext>
-            </a:extLst>
-          </p:cNvPr>
-          <p:cNvSpPr>
-            <a:spLocks noGrp="1" noRot="1" noChangeAspect="1" noMove="1" noResize="1" noEditPoints="1" noAdjustHandles="1" noChangeArrowheads="1" noChangeShapeType="1" noTextEdit="1"/>
-          </p:cNvSpPr>
-          <p:nvPr>
-            <p:extLst>
-              <p:ext uri="{386F3935-93C4-4BCD-93E2-E3B085C9AB24}">
-                <p16:designElem xmlns:p16="http://schemas.microsoft.com/office/powerpoint/2015/main" val="1"/>
-              </p:ext>
-            </p:extLst>
-          </p:nvPr>
-        </p:nvSpPr>
-        <p:spPr>
-          <a:xfrm>
-            <a:off x="0" y="0"/>
-            <a:ext cx="12192000" cy="6858000"/>
-          </a:xfrm>
-          <a:prstGeom prst="rect">
-            <a:avLst/>
-          </a:prstGeom>
-          <a:ln w="12700" cap="flat" cmpd="sng" algn="ctr">
-            <a:noFill/>
-            <a:prstDash val="solid"/>
-            <a:miter lim="800000"/>
-          </a:ln>
-          <a:effectLst/>
-          <a:extLst>
-            <a:ext uri="{91240B29-F687-4F45-9708-019B960494DF}">
-              <a14:hiddenLine xmlns:a14="http://schemas.microsoft.com/office/drawing/2010/main" w="12700" cap="flat" cmpd="sng" algn="ctr">
-                <a:solidFill>
-                  <a:schemeClr val="accent1">
-                    <a:shade val="50000"/>
-                  </a:schemeClr>
-                </a:solidFill>
-                <a:prstDash val="solid"/>
-                <a:miter lim="800000"/>
-              </a14:hiddenLine>
-            </a:ext>
-          </a:extLst>
-        </p:spPr>
-        <p:style>
-          <a:lnRef idx="2">
-            <a:schemeClr val="accent1">
-              <a:shade val="50000"/>
-            </a:schemeClr>
-          </a:lnRef>
-          <a:fillRef idx="1">
-            <a:schemeClr val="accent1"/>
-          </a:fillRef>
-          <a:effectRef idx="0">
-            <a:schemeClr val="accent1"/>
-          </a:effectRef>
-          <a:fontRef idx="minor">
-            <a:schemeClr val="lt1"/>
-          </a:fontRef>
-        </p:style>
-        <p:txBody>
-          <a:bodyPr rtlCol="0" anchor="ctr"/>
-          <a:lstStyle/>
-          <a:p>
-            <a:pPr algn="ctr"/>
-            <a:endParaRPr lang="en-US"/>
-          </a:p>
-        </p:txBody>
-      </p:sp>
-      <p:sp>
-        <p:nvSpPr>
-          <p:cNvPr id="2" name="Titre 1">
-            <a:extLst>
-              <a:ext uri="{FF2B5EF4-FFF2-40B4-BE49-F238E27FC236}">
-                <a16:creationId xmlns:a16="http://schemas.microsoft.com/office/drawing/2014/main" id="{5376D3CA-0545-EF33-2F00-3C8844A712D2}"/>
-              </a:ext>
-            </a:extLst>
-          </p:cNvPr>
-          <p:cNvSpPr>
-            <a:spLocks noGrp="1"/>
-          </p:cNvSpPr>
-          <p:nvPr>
-            <p:ph type="title"/>
-          </p:nvPr>
-        </p:nvSpPr>
-        <p:spPr>
-          <a:xfrm>
-            <a:off x="704088" y="914400"/>
-            <a:ext cx="3799763" cy="1473200"/>
-          </a:xfrm>
-        </p:spPr>
-        <p:txBody>
-          <a:bodyPr>
-            <a:normAutofit/>
-          </a:bodyPr>
-          <a:lstStyle/>
-          <a:p>
-            <a:r>
-              <a:rPr lang="fr-FR" sz="3600"/>
-              <a:t>Conclusion</a:t>
-            </a:r>
-          </a:p>
-        </p:txBody>
-      </p:sp>
-      <p:cxnSp>
-        <p:nvCxnSpPr>
-          <p:cNvPr id="14" name="Straight Connector 13">
-            <a:extLst>
-              <a:ext uri="{FF2B5EF4-FFF2-40B4-BE49-F238E27FC236}">
-                <a16:creationId xmlns:a16="http://schemas.microsoft.com/office/drawing/2014/main" id="{D2E57F3D-33BE-4306-87E6-245763719516}"/>
-              </a:ext>
-              <a:ext uri="{C183D7F6-B498-43B3-948B-1728B52AA6E4}">
-                <adec:decorative xmlns:adec="http://schemas.microsoft.com/office/drawing/2017/decorative" val="1"/>
-              </a:ext>
-            </a:extLst>
-          </p:cNvPr>
-          <p:cNvCxnSpPr>
-            <a:cxnSpLocks noGrp="1" noRot="1" noChangeAspect="1" noMove="1" noResize="1" noEditPoints="1" noAdjustHandles="1" noChangeArrowheads="1" noChangeShapeType="1"/>
-          </p:cNvCxnSpPr>
-          <p:nvPr>
-            <p:extLst>
-              <p:ext uri="{386F3935-93C4-4BCD-93E2-E3B085C9AB24}">
-                <p16:designElem xmlns:p16="http://schemas.microsoft.com/office/powerpoint/2015/main" val="1"/>
-              </p:ext>
-            </p:extLst>
-          </p:nvPr>
-        </p:nvCxnSpPr>
-        <p:spPr>
-          <a:xfrm>
-            <a:off x="804672" y="722376"/>
-            <a:ext cx="1638300" cy="0"/>
-          </a:xfrm>
-          <a:prstGeom prst="line">
-            <a:avLst/>
-          </a:prstGeom>
-          <a:ln w="44450">
-            <a:solidFill>
-              <a:schemeClr val="tx1"/>
-            </a:solidFill>
-          </a:ln>
-        </p:spPr>
-        <p:style>
-          <a:lnRef idx="1">
-            <a:schemeClr val="accent1"/>
-          </a:lnRef>
-          <a:fillRef idx="0">
-            <a:schemeClr val="accent1"/>
-          </a:fillRef>
-          <a:effectRef idx="0">
-            <a:schemeClr val="accent1"/>
-          </a:effectRef>
-          <a:fontRef idx="minor">
-            <a:schemeClr val="tx1"/>
-          </a:fontRef>
-        </p:style>
-      </p:cxnSp>
-      <p:sp>
-        <p:nvSpPr>
-          <p:cNvPr id="9" name="Content Placeholder 8">
-            <a:extLst>
-              <a:ext uri="{FF2B5EF4-FFF2-40B4-BE49-F238E27FC236}">
-                <a16:creationId xmlns:a16="http://schemas.microsoft.com/office/drawing/2014/main" id="{70741EC4-4012-4473-B504-168C3994C3FF}"/>
-              </a:ext>
-            </a:extLst>
-          </p:cNvPr>
-          <p:cNvSpPr>
-            <a:spLocks noGrp="1"/>
-          </p:cNvSpPr>
-          <p:nvPr>
-            <p:ph idx="1"/>
-          </p:nvPr>
-        </p:nvSpPr>
-        <p:spPr>
-          <a:xfrm>
-            <a:off x="704088" y="2387600"/>
-            <a:ext cx="3799763" cy="3767328"/>
-          </a:xfrm>
-        </p:spPr>
-        <p:txBody>
-          <a:bodyPr>
-            <a:normAutofit lnSpcReduction="10000"/>
-          </a:bodyPr>
-          <a:lstStyle/>
-          <a:p>
-            <a:r>
-              <a:rPr lang="en-US" dirty="0"/>
-              <a:t>Current prices vs the other valuations</a:t>
-            </a:r>
-          </a:p>
-          <a:p>
-            <a:endParaRPr lang="en-US" dirty="0"/>
-          </a:p>
-          <a:p>
-            <a:r>
-              <a:rPr lang="en-US" dirty="0"/>
-              <a:t>It has potential in the long term , specially if the lithium prices keep climbing</a:t>
-            </a:r>
-          </a:p>
-          <a:p>
-            <a:endParaRPr lang="en-US" dirty="0"/>
-          </a:p>
-          <a:p>
-            <a:r>
-              <a:rPr lang="en-US" dirty="0"/>
-              <a:t>They also are reducing their dividends so the Gordon Shapiro model is not real…</a:t>
-            </a:r>
-          </a:p>
-        </p:txBody>
-      </p:sp>
-      <p:pic>
-        <p:nvPicPr>
-          <p:cNvPr id="5" name="Espace réservé du contenu 4" descr="Une image contenant texte, capture d’écran, diagramme, Rectangle&#10;&#10;Le contenu généré par l’IA peut être incorrect.">
-            <a:extLst>
-              <a:ext uri="{FF2B5EF4-FFF2-40B4-BE49-F238E27FC236}">
-                <a16:creationId xmlns:a16="http://schemas.microsoft.com/office/drawing/2014/main" id="{3A1FAD58-E477-E514-9A2D-73CF98F92C3C}"/>
-              </a:ext>
-            </a:extLst>
-          </p:cNvPr>
-          <p:cNvPicPr>
-            <a:picLocks noChangeAspect="1"/>
-          </p:cNvPicPr>
-          <p:nvPr/>
-        </p:nvPicPr>
-        <p:blipFill>
-          <a:blip r:embed="rId2">
-            <a:extLst>
-              <a:ext uri="{28A0092B-C50C-407E-A947-70E740481C1C}">
-                <a14:useLocalDpi xmlns:a14="http://schemas.microsoft.com/office/drawing/2010/main" val="0"/>
-              </a:ext>
-            </a:extLst>
-          </a:blip>
-          <a:srcRect r="2" b="4639"/>
-          <a:stretch>
-            <a:fillRect/>
-          </a:stretch>
-        </p:blipFill>
-        <p:spPr>
-          <a:xfrm>
-            <a:off x="4981575" y="735286"/>
-            <a:ext cx="6495042" cy="5419642"/>
-          </a:xfrm>
-          <a:prstGeom prst="rect">
-            <a:avLst/>
-          </a:prstGeom>
-        </p:spPr>
-      </p:pic>
-    </p:spTree>
-    <p:extLst>
-      <p:ext uri="{BB962C8B-B14F-4D97-AF65-F5344CB8AC3E}">
-        <p14:creationId xmlns:p14="http://schemas.microsoft.com/office/powerpoint/2010/main" val="608762126"/>
       </p:ext>
     </p:extLst>
   </p:cSld>

</xml_diff>